<commit_message>
🖼️ Add new figures to the document
</commit_message>
<xml_diff>
--- a/Linearity_Studies_Nov2025/Protoboard-mapping.pptx
+++ b/Linearity_Studies_Nov2025/Protoboard-mapping.pptx
@@ -16581,12 +16581,52 @@
           </a:prstGeom>
         </p:spPr>
       </p:pic>
+      <p:sp>
+        <p:nvSpPr>
+          <p:cNvPr id="169" name="TextBox 24">
+            <a:extLst>
+              <a:ext uri="{FF2B5EF4-FFF2-40B4-BE49-F238E27FC236}">
+                <a16:creationId xmlns:a16="http://schemas.microsoft.com/office/drawing/2014/main" id="{5929C090-74C9-4E56-8DB3-00A9EEB5B897}"/>
+              </a:ext>
+            </a:extLst>
+          </p:cNvPr>
+          <p:cNvSpPr txBox="1"/>
+          <p:nvPr/>
+        </p:nvSpPr>
+        <p:spPr>
+          <a:xfrm>
+            <a:off x="7581918" y="4284450"/>
+            <a:ext cx="3009174" cy="276999"/>
+          </a:xfrm>
+          <a:prstGeom prst="rect">
+            <a:avLst/>
+          </a:prstGeom>
+          <a:noFill/>
+        </p:spPr>
+        <p:txBody>
+          <a:bodyPr wrap="square" rtlCol="0">
+            <a:spAutoFit/>
+          </a:bodyPr>
+          <a:lstStyle/>
+          <a:p>
+            <a:pPr algn="ctr"/>
+            <a:r>
+              <a:rPr lang="en-US" sz="1200" dirty="0"/>
+              <a:t>Connector</a:t>
+            </a:r>
+            <a:r>
+              <a:rPr lang="en-US" sz="1200" noProof="0" dirty="0"/>
+              <a:t>:ASIC (After Modifications)</a:t>
+            </a:r>
+          </a:p>
+        </p:txBody>
+      </p:sp>
       <p:pic>
         <p:nvPicPr>
-          <p:cNvPr id="30" name="Image 29">
-            <a:extLst>
-              <a:ext uri="{FF2B5EF4-FFF2-40B4-BE49-F238E27FC236}">
-                <a16:creationId xmlns:a16="http://schemas.microsoft.com/office/drawing/2014/main" id="{ED29CF94-4284-4B46-A66D-22CB77763F60}"/>
+          <p:cNvPr id="3" name="Image 2">
+            <a:extLst>
+              <a:ext uri="{FF2B5EF4-FFF2-40B4-BE49-F238E27FC236}">
+                <a16:creationId xmlns:a16="http://schemas.microsoft.com/office/drawing/2014/main" id="{08DF4CA4-D252-4F45-BD39-F1027A59C6C7}"/>
               </a:ext>
             </a:extLst>
           </p:cNvPr>
@@ -16603,8 +16643,8 @@
         </p:blipFill>
         <p:spPr>
           <a:xfrm>
-            <a:off x="6349176" y="4540750"/>
-            <a:ext cx="2107438" cy="1513366"/>
+            <a:off x="6355698" y="4541894"/>
+            <a:ext cx="2069983" cy="1486469"/>
           </a:xfrm>
           <a:prstGeom prst="rect">
             <a:avLst/>
@@ -16613,10 +16653,10 @@
       </p:pic>
       <p:pic>
         <p:nvPicPr>
-          <p:cNvPr id="31" name="Image 30">
-            <a:extLst>
-              <a:ext uri="{FF2B5EF4-FFF2-40B4-BE49-F238E27FC236}">
-                <a16:creationId xmlns:a16="http://schemas.microsoft.com/office/drawing/2014/main" id="{07D57EB0-78E2-4B99-B67C-F7C0B0ADB71F}"/>
+          <p:cNvPr id="4" name="Image 3">
+            <a:extLst>
+              <a:ext uri="{FF2B5EF4-FFF2-40B4-BE49-F238E27FC236}">
+                <a16:creationId xmlns:a16="http://schemas.microsoft.com/office/drawing/2014/main" id="{9C1D4CF9-0E70-482F-9219-21D0979D3940}"/>
               </a:ext>
             </a:extLst>
           </p:cNvPr>
@@ -16633,54 +16673,14 @@
         </p:blipFill>
         <p:spPr>
           <a:xfrm>
-            <a:off x="9723484" y="4537630"/>
-            <a:ext cx="2107438" cy="1516486"/>
+            <a:off x="9741015" y="4544168"/>
+            <a:ext cx="2103444" cy="1513612"/>
           </a:xfrm>
           <a:prstGeom prst="rect">
             <a:avLst/>
           </a:prstGeom>
         </p:spPr>
       </p:pic>
-      <p:sp>
-        <p:nvSpPr>
-          <p:cNvPr id="169" name="TextBox 24">
-            <a:extLst>
-              <a:ext uri="{FF2B5EF4-FFF2-40B4-BE49-F238E27FC236}">
-                <a16:creationId xmlns:a16="http://schemas.microsoft.com/office/drawing/2014/main" id="{5929C090-74C9-4E56-8DB3-00A9EEB5B897}"/>
-              </a:ext>
-            </a:extLst>
-          </p:cNvPr>
-          <p:cNvSpPr txBox="1"/>
-          <p:nvPr/>
-        </p:nvSpPr>
-        <p:spPr>
-          <a:xfrm>
-            <a:off x="7581918" y="4284450"/>
-            <a:ext cx="3009174" cy="276999"/>
-          </a:xfrm>
-          <a:prstGeom prst="rect">
-            <a:avLst/>
-          </a:prstGeom>
-          <a:noFill/>
-        </p:spPr>
-        <p:txBody>
-          <a:bodyPr wrap="square" rtlCol="0">
-            <a:spAutoFit/>
-          </a:bodyPr>
-          <a:lstStyle/>
-          <a:p>
-            <a:pPr algn="ctr"/>
-            <a:r>
-              <a:rPr lang="en-US" sz="1200" dirty="0"/>
-              <a:t>Connector</a:t>
-            </a:r>
-            <a:r>
-              <a:rPr lang="en-US" sz="1200" noProof="0" dirty="0"/>
-              <a:t>:ASIC (After Modifications)</a:t>
-            </a:r>
-          </a:p>
-        </p:txBody>
-      </p:sp>
     </p:spTree>
     <p:extLst>
       <p:ext uri="{BB962C8B-B14F-4D97-AF65-F5344CB8AC3E}">
@@ -25992,12 +25992,92 @@
           </a:prstGeom>
         </p:spPr>
       </p:pic>
+      <p:sp>
+        <p:nvSpPr>
+          <p:cNvPr id="160" name="TextBox 24">
+            <a:extLst>
+              <a:ext uri="{FF2B5EF4-FFF2-40B4-BE49-F238E27FC236}">
+                <a16:creationId xmlns:a16="http://schemas.microsoft.com/office/drawing/2014/main" id="{4D4ADEF8-6BF3-4C30-8016-C4FDB2A72F67}"/>
+              </a:ext>
+            </a:extLst>
+          </p:cNvPr>
+          <p:cNvSpPr txBox="1"/>
+          <p:nvPr/>
+        </p:nvSpPr>
+        <p:spPr>
+          <a:xfrm>
+            <a:off x="7500577" y="4014892"/>
+            <a:ext cx="3009174" cy="276999"/>
+          </a:xfrm>
+          <a:prstGeom prst="rect">
+            <a:avLst/>
+          </a:prstGeom>
+          <a:noFill/>
+        </p:spPr>
+        <p:txBody>
+          <a:bodyPr wrap="square" rtlCol="0">
+            <a:spAutoFit/>
+          </a:bodyPr>
+          <a:lstStyle/>
+          <a:p>
+            <a:pPr algn="ctr"/>
+            <a:r>
+              <a:rPr lang="en-US" sz="1200" dirty="0"/>
+              <a:t>Connector</a:t>
+            </a:r>
+            <a:r>
+              <a:rPr lang="en-US" sz="1200" noProof="0" dirty="0"/>
+              <a:t>:ASIC (After Modifications)</a:t>
+            </a:r>
+          </a:p>
+        </p:txBody>
+      </p:sp>
+      <p:sp>
+        <p:nvSpPr>
+          <p:cNvPr id="161" name="TextBox 24">
+            <a:extLst>
+              <a:ext uri="{FF2B5EF4-FFF2-40B4-BE49-F238E27FC236}">
+                <a16:creationId xmlns:a16="http://schemas.microsoft.com/office/drawing/2014/main" id="{3376BA0B-6959-49D6-B4B7-D9BDE1B63F1E}"/>
+              </a:ext>
+            </a:extLst>
+          </p:cNvPr>
+          <p:cNvSpPr txBox="1"/>
+          <p:nvPr/>
+        </p:nvSpPr>
+        <p:spPr>
+          <a:xfrm>
+            <a:off x="1221253" y="4019626"/>
+            <a:ext cx="3527065" cy="276999"/>
+          </a:xfrm>
+          <a:prstGeom prst="rect">
+            <a:avLst/>
+          </a:prstGeom>
+          <a:noFill/>
+        </p:spPr>
+        <p:txBody>
+          <a:bodyPr wrap="square" rtlCol="0">
+            <a:spAutoFit/>
+          </a:bodyPr>
+          <a:lstStyle/>
+          <a:p>
+            <a:pPr algn="ctr"/>
+            <a:r>
+              <a:rPr lang="en-US" sz="1200" dirty="0"/>
+              <a:t>Connector</a:t>
+            </a:r>
+            <a:r>
+              <a:rPr lang="en-US" sz="1200" noProof="0" dirty="0"/>
+              <a:t>:ASIC (Before Modifications – No ToT)</a:t>
+            </a:r>
+          </a:p>
+        </p:txBody>
+      </p:sp>
       <p:pic>
         <p:nvPicPr>
-          <p:cNvPr id="7" name="Image 6">
-            <a:extLst>
-              <a:ext uri="{FF2B5EF4-FFF2-40B4-BE49-F238E27FC236}">
-                <a16:creationId xmlns:a16="http://schemas.microsoft.com/office/drawing/2014/main" id="{3B04D503-463A-4E28-945E-1F47CCCE52CC}"/>
+          <p:cNvPr id="4" name="Image 3">
+            <a:extLst>
+              <a:ext uri="{FF2B5EF4-FFF2-40B4-BE49-F238E27FC236}">
+                <a16:creationId xmlns:a16="http://schemas.microsoft.com/office/drawing/2014/main" id="{8D0652B3-31C6-49E0-B165-4CFD5B8E7CF9}"/>
               </a:ext>
             </a:extLst>
           </p:cNvPr>
@@ -26014,8 +26094,8 @@
         </p:blipFill>
         <p:spPr>
           <a:xfrm>
-            <a:off x="6282142" y="4270832"/>
-            <a:ext cx="2081312" cy="1491536"/>
+            <a:off x="6287140" y="4268892"/>
+            <a:ext cx="2071613" cy="1491902"/>
           </a:xfrm>
           <a:prstGeom prst="rect">
             <a:avLst/>
@@ -26024,10 +26104,10 @@
       </p:pic>
       <p:pic>
         <p:nvPicPr>
-          <p:cNvPr id="8" name="Image 7">
-            <a:extLst>
-              <a:ext uri="{FF2B5EF4-FFF2-40B4-BE49-F238E27FC236}">
-                <a16:creationId xmlns:a16="http://schemas.microsoft.com/office/drawing/2014/main" id="{FE86EA7F-4E05-48EC-9230-F5DBE3974B61}"/>
+          <p:cNvPr id="5" name="Image 4">
+            <a:extLst>
+              <a:ext uri="{FF2B5EF4-FFF2-40B4-BE49-F238E27FC236}">
+                <a16:creationId xmlns:a16="http://schemas.microsoft.com/office/drawing/2014/main" id="{DAB83647-D220-4141-8B6E-9307EC37638C}"/>
               </a:ext>
             </a:extLst>
           </p:cNvPr>
@@ -26044,94 +26124,14 @@
         </p:blipFill>
         <p:spPr>
           <a:xfrm>
-            <a:off x="9640618" y="4268891"/>
-            <a:ext cx="2055272" cy="1478280"/>
+            <a:off x="9647903" y="4268892"/>
+            <a:ext cx="2075876" cy="1491902"/>
           </a:xfrm>
           <a:prstGeom prst="rect">
             <a:avLst/>
           </a:prstGeom>
         </p:spPr>
       </p:pic>
-      <p:sp>
-        <p:nvSpPr>
-          <p:cNvPr id="160" name="TextBox 24">
-            <a:extLst>
-              <a:ext uri="{FF2B5EF4-FFF2-40B4-BE49-F238E27FC236}">
-                <a16:creationId xmlns:a16="http://schemas.microsoft.com/office/drawing/2014/main" id="{4D4ADEF8-6BF3-4C30-8016-C4FDB2A72F67}"/>
-              </a:ext>
-            </a:extLst>
-          </p:cNvPr>
-          <p:cNvSpPr txBox="1"/>
-          <p:nvPr/>
-        </p:nvSpPr>
-        <p:spPr>
-          <a:xfrm>
-            <a:off x="7500577" y="4014892"/>
-            <a:ext cx="3009174" cy="276999"/>
-          </a:xfrm>
-          <a:prstGeom prst="rect">
-            <a:avLst/>
-          </a:prstGeom>
-          <a:noFill/>
-        </p:spPr>
-        <p:txBody>
-          <a:bodyPr wrap="square" rtlCol="0">
-            <a:spAutoFit/>
-          </a:bodyPr>
-          <a:lstStyle/>
-          <a:p>
-            <a:pPr algn="ctr"/>
-            <a:r>
-              <a:rPr lang="en-US" sz="1200" dirty="0"/>
-              <a:t>Connector</a:t>
-            </a:r>
-            <a:r>
-              <a:rPr lang="en-US" sz="1200" noProof="0" dirty="0"/>
-              <a:t>:ASIC (After Modifications)</a:t>
-            </a:r>
-          </a:p>
-        </p:txBody>
-      </p:sp>
-      <p:sp>
-        <p:nvSpPr>
-          <p:cNvPr id="161" name="TextBox 24">
-            <a:extLst>
-              <a:ext uri="{FF2B5EF4-FFF2-40B4-BE49-F238E27FC236}">
-                <a16:creationId xmlns:a16="http://schemas.microsoft.com/office/drawing/2014/main" id="{3376BA0B-6959-49D6-B4B7-D9BDE1B63F1E}"/>
-              </a:ext>
-            </a:extLst>
-          </p:cNvPr>
-          <p:cNvSpPr txBox="1"/>
-          <p:nvPr/>
-        </p:nvSpPr>
-        <p:spPr>
-          <a:xfrm>
-            <a:off x="1470925" y="4019626"/>
-            <a:ext cx="3009174" cy="276999"/>
-          </a:xfrm>
-          <a:prstGeom prst="rect">
-            <a:avLst/>
-          </a:prstGeom>
-          <a:noFill/>
-        </p:spPr>
-        <p:txBody>
-          <a:bodyPr wrap="square" rtlCol="0">
-            <a:spAutoFit/>
-          </a:bodyPr>
-          <a:lstStyle/>
-          <a:p>
-            <a:pPr algn="ctr"/>
-            <a:r>
-              <a:rPr lang="en-US" sz="1200" dirty="0"/>
-              <a:t>Connector</a:t>
-            </a:r>
-            <a:r>
-              <a:rPr lang="en-US" sz="1200" noProof="0" dirty="0"/>
-              <a:t>:ASIC (Before Modifications)</a:t>
-            </a:r>
-          </a:p>
-        </p:txBody>
-      </p:sp>
     </p:spTree>
     <p:extLst>
       <p:ext uri="{BB962C8B-B14F-4D97-AF65-F5344CB8AC3E}">

</xml_diff>